<commit_message>
corrected one of the plots in presentation
</commit_message>
<xml_diff>
--- a/Report/Presentation_3_IoT.pptx
+++ b/Report/Presentation_3_IoT.pptx
@@ -224,7 +224,7 @@
           <a:p>
             <a:fld id="{B56F32FC-4BD9-442A-A8C6-51598C909FE3}" type="datetimeFigureOut">
               <a:rPr lang="en-US" smtClean="0"/>
-              <a:t>2/16/2023</a:t>
+              <a:t>2/17/2023</a:t>
             </a:fld>
             <a:endParaRPr lang="en-US" dirty="0"/>
           </a:p>
@@ -401,7 +401,7 @@
           <a:p>
             <a:fld id="{056371FA-A98D-41E8-93F4-09945841298A}" type="datetimeFigureOut">
               <a:rPr lang="en-US" smtClean="0"/>
-              <a:t>2/16/2023</a:t>
+              <a:t>2/17/2023</a:t>
             </a:fld>
             <a:endParaRPr lang="en-US" dirty="0"/>
           </a:p>
@@ -16086,10 +16086,10 @@
       </p:pic>
       <p:pic>
         <p:nvPicPr>
-          <p:cNvPr id="14" name="Picture 13" descr="Chart, line chart&#10;&#10;Description automatically generated">
-            <a:extLst>
-              <a:ext uri="{FF2B5EF4-FFF2-40B4-BE49-F238E27FC236}">
-                <a16:creationId xmlns:a16="http://schemas.microsoft.com/office/drawing/2014/main" id="{D1A4A6C5-9B5C-6712-FD44-027F4E59D65B}"/>
+          <p:cNvPr id="18" name="Picture 17" descr="Chart, line chart, histogram&#10;&#10;Description automatically generated">
+            <a:extLst>
+              <a:ext uri="{FF2B5EF4-FFF2-40B4-BE49-F238E27FC236}">
+                <a16:creationId xmlns:a16="http://schemas.microsoft.com/office/drawing/2014/main" id="{87877037-8DA9-9035-DEC2-58F765BC34F4}"/>
               </a:ext>
             </a:extLst>
           </p:cNvPr>
@@ -16106,8 +16106,8 @@
         </p:blipFill>
         <p:spPr>
           <a:xfrm>
-            <a:off x="5333268" y="1110870"/>
-            <a:ext cx="1672717" cy="1270026"/>
+            <a:off x="7235702" y="1142937"/>
+            <a:ext cx="2713256" cy="1205892"/>
           </a:xfrm>
           <a:prstGeom prst="rect">
             <a:avLst/>
@@ -16116,10 +16116,10 @@
       </p:pic>
       <p:pic>
         <p:nvPicPr>
-          <p:cNvPr id="18" name="Picture 17" descr="Chart, line chart, histogram&#10;&#10;Description automatically generated">
-            <a:extLst>
-              <a:ext uri="{FF2B5EF4-FFF2-40B4-BE49-F238E27FC236}">
-                <a16:creationId xmlns:a16="http://schemas.microsoft.com/office/drawing/2014/main" id="{87877037-8DA9-9035-DEC2-58F765BC34F4}"/>
+          <p:cNvPr id="20" name="Picture 19" descr="Chart, line chart&#10;&#10;Description automatically generated">
+            <a:extLst>
+              <a:ext uri="{FF2B5EF4-FFF2-40B4-BE49-F238E27FC236}">
+                <a16:creationId xmlns:a16="http://schemas.microsoft.com/office/drawing/2014/main" id="{C189426B-5042-8B16-776B-F0C6D0E61603}"/>
               </a:ext>
             </a:extLst>
           </p:cNvPr>
@@ -16136,8 +16136,8 @@
         </p:blipFill>
         <p:spPr>
           <a:xfrm>
-            <a:off x="7235702" y="1142937"/>
-            <a:ext cx="2713256" cy="1205892"/>
+            <a:off x="7320742" y="2699256"/>
+            <a:ext cx="2543175" cy="1450325"/>
           </a:xfrm>
           <a:prstGeom prst="rect">
             <a:avLst/>
@@ -16146,10 +16146,10 @@
       </p:pic>
       <p:pic>
         <p:nvPicPr>
-          <p:cNvPr id="20" name="Picture 19" descr="Chart, line chart&#10;&#10;Description automatically generated">
-            <a:extLst>
-              <a:ext uri="{FF2B5EF4-FFF2-40B4-BE49-F238E27FC236}">
-                <a16:creationId xmlns:a16="http://schemas.microsoft.com/office/drawing/2014/main" id="{C189426B-5042-8B16-776B-F0C6D0E61603}"/>
+          <p:cNvPr id="22" name="Picture 21" descr="Chart, line chart&#10;&#10;Description automatically generated">
+            <a:extLst>
+              <a:ext uri="{FF2B5EF4-FFF2-40B4-BE49-F238E27FC236}">
+                <a16:creationId xmlns:a16="http://schemas.microsoft.com/office/drawing/2014/main" id="{C1CB84C5-228B-B309-3554-5E59330267F7}"/>
               </a:ext>
             </a:extLst>
           </p:cNvPr>
@@ -16166,8 +16166,8 @@
         </p:blipFill>
         <p:spPr>
           <a:xfrm>
-            <a:off x="7320742" y="2699256"/>
-            <a:ext cx="2543175" cy="1450325"/>
+            <a:off x="2881915" y="4920195"/>
+            <a:ext cx="1962515" cy="1618717"/>
           </a:xfrm>
           <a:prstGeom prst="rect">
             <a:avLst/>
@@ -16176,10 +16176,10 @@
       </p:pic>
       <p:pic>
         <p:nvPicPr>
-          <p:cNvPr id="22" name="Picture 21" descr="Chart, line chart&#10;&#10;Description automatically generated">
-            <a:extLst>
-              <a:ext uri="{FF2B5EF4-FFF2-40B4-BE49-F238E27FC236}">
-                <a16:creationId xmlns:a16="http://schemas.microsoft.com/office/drawing/2014/main" id="{C1CB84C5-228B-B309-3554-5E59330267F7}"/>
+          <p:cNvPr id="24" name="Picture 23" descr="Chart, line chart&#10;&#10;Description automatically generated">
+            <a:extLst>
+              <a:ext uri="{FF2B5EF4-FFF2-40B4-BE49-F238E27FC236}">
+                <a16:creationId xmlns:a16="http://schemas.microsoft.com/office/drawing/2014/main" id="{539F82ED-935C-4FEC-73BD-625779E0D33D}"/>
               </a:ext>
             </a:extLst>
           </p:cNvPr>
@@ -16190,36 +16190,6 @@
         </p:nvPicPr>
         <p:blipFill>
           <a:blip r:embed="rId8"/>
-          <a:stretch>
-            <a:fillRect/>
-          </a:stretch>
-        </p:blipFill>
-        <p:spPr>
-          <a:xfrm>
-            <a:off x="2881915" y="4920195"/>
-            <a:ext cx="1962515" cy="1618717"/>
-          </a:xfrm>
-          <a:prstGeom prst="rect">
-            <a:avLst/>
-          </a:prstGeom>
-        </p:spPr>
-      </p:pic>
-      <p:pic>
-        <p:nvPicPr>
-          <p:cNvPr id="24" name="Picture 23" descr="Chart, line chart&#10;&#10;Description automatically generated">
-            <a:extLst>
-              <a:ext uri="{FF2B5EF4-FFF2-40B4-BE49-F238E27FC236}">
-                <a16:creationId xmlns:a16="http://schemas.microsoft.com/office/drawing/2014/main" id="{539F82ED-935C-4FEC-73BD-625779E0D33D}"/>
-              </a:ext>
-            </a:extLst>
-          </p:cNvPr>
-          <p:cNvPicPr>
-            <a:picLocks noChangeAspect="1"/>
-          </p:cNvPicPr>
-          <p:nvPr/>
-        </p:nvPicPr>
-        <p:blipFill>
-          <a:blip r:embed="rId9"/>
           <a:stretch>
             <a:fillRect/>
           </a:stretch>
@@ -16269,7 +16239,7 @@
             <p:nvPr/>
           </p:nvPicPr>
           <p:blipFill>
-            <a:blip r:embed="rId10"/>
+            <a:blip r:embed="rId9"/>
             <a:stretch>
               <a:fillRect/>
             </a:stretch>
@@ -16352,7 +16322,7 @@
           <p:nvPr/>
         </p:nvPicPr>
         <p:blipFill>
-          <a:blip r:embed="rId11"/>
+          <a:blip r:embed="rId10"/>
           <a:stretch>
             <a:fillRect/>
           </a:stretch>
@@ -16553,8 +16523,8 @@
             </a:extLst>
           </p:cNvPr>
           <p:cNvCxnSpPr>
+            <a:cxnSpLocks/>
             <a:stCxn id="9" idx="3"/>
-            <a:endCxn id="14" idx="1"/>
           </p:cNvCxnSpPr>
           <p:nvPr/>
         </p:nvCxnSpPr>
@@ -16992,7 +16962,7 @@
             </a:extLst>
           </p:cNvPr>
           <p:cNvCxnSpPr>
-            <a:stCxn id="14" idx="3"/>
+            <a:cxnSpLocks/>
             <a:endCxn id="18" idx="1"/>
           </p:cNvCxnSpPr>
           <p:nvPr/>
@@ -18921,6 +18891,36 @@
           </a:fontRef>
         </p:style>
       </p:cxnSp>
+      <p:pic>
+        <p:nvPicPr>
+          <p:cNvPr id="4" name="Picture 3" descr="Chart, line chart&#10;&#10;Description automatically generated">
+            <a:extLst>
+              <a:ext uri="{FF2B5EF4-FFF2-40B4-BE49-F238E27FC236}">
+                <a16:creationId xmlns:a16="http://schemas.microsoft.com/office/drawing/2014/main" id="{D1F1A770-792B-F6D5-5B41-0CED475446AB}"/>
+              </a:ext>
+            </a:extLst>
+          </p:cNvPr>
+          <p:cNvPicPr>
+            <a:picLocks noChangeAspect="1"/>
+          </p:cNvPicPr>
+          <p:nvPr/>
+        </p:nvPicPr>
+        <p:blipFill>
+          <a:blip r:embed="rId11"/>
+          <a:stretch>
+            <a:fillRect/>
+          </a:stretch>
+        </p:blipFill>
+        <p:spPr>
+          <a:xfrm>
+            <a:off x="5342229" y="1043497"/>
+            <a:ext cx="1695121" cy="1275508"/>
+          </a:xfrm>
+          <a:prstGeom prst="rect">
+            <a:avLst/>
+          </a:prstGeom>
+        </p:spPr>
+      </p:pic>
     </p:spTree>
     <p:extLst>
       <p:ext uri="{BB962C8B-B14F-4D97-AF65-F5344CB8AC3E}">
@@ -20674,15 +20674,6 @@
 </file>
 
 <file path=customXml/item1.xml><?xml version="1.0" encoding="utf-8"?>
-<?mso-contentType ?>
-<FormTemplates xmlns="http://schemas.microsoft.com/sharepoint/v3/contenttype/forms">
-  <Display>DocumentLibraryForm</Display>
-  <Edit>DocumentLibraryForm</Edit>
-  <New>DocumentLibraryForm</New>
-</FormTemplates>
-</file>
-
-<file path=customXml/item2.xml><?xml version="1.0" encoding="utf-8"?>
 <p:properties xmlns:p="http://schemas.microsoft.com/office/2006/metadata/properties" xmlns:xsi="http://www.w3.org/2001/XMLSchema-instance" xmlns:pc="http://schemas.microsoft.com/office/infopath/2007/PartnerControls">
   <documentManagement>
     <_ip_UnifiedCompliancePolicyUIAction xmlns="http://schemas.microsoft.com/sharepoint/v3" xsi:nil="true"/>
@@ -20699,6 +20690,15 @@
     <MediaServiceKeyPoints xmlns="71af3243-3dd4-4a8d-8c0d-dd76da1f02a5" xsi:nil="true"/>
   </documentManagement>
 </p:properties>
+</file>
+
+<file path=customXml/item2.xml><?xml version="1.0" encoding="utf-8"?>
+<?mso-contentType ?>
+<FormTemplates xmlns="http://schemas.microsoft.com/sharepoint/v3/contenttype/forms">
+  <Display>DocumentLibraryForm</Display>
+  <Edit>DocumentLibraryForm</Edit>
+  <New>DocumentLibraryForm</New>
+</FormTemplates>
 </file>
 
 <file path=customXml/item3.xml><?xml version="1.0" encoding="utf-8"?>
@@ -20978,14 +20978,6 @@
 </file>
 
 <file path=customXml/itemProps1.xml><?xml version="1.0" encoding="utf-8"?>
-<ds:datastoreItem xmlns:ds="http://schemas.openxmlformats.org/officeDocument/2006/customXml" ds:itemID="{0FD6FE22-81A0-4500-AFD0-342D21BB9A2C}">
-  <ds:schemaRefs>
-    <ds:schemaRef ds:uri="http://schemas.microsoft.com/sharepoint/v3/contenttype/forms"/>
-  </ds:schemaRefs>
-</ds:datastoreItem>
-</file>
-
-<file path=customXml/itemProps2.xml><?xml version="1.0" encoding="utf-8"?>
 <ds:datastoreItem xmlns:ds="http://schemas.openxmlformats.org/officeDocument/2006/customXml" ds:itemID="{29C43685-694E-4579-B109-3C418D49DA65}">
   <ds:schemaRefs>
     <ds:schemaRef ds:uri="http://schemas.microsoft.com/office/2006/metadata/properties"/>
@@ -20993,6 +20985,14 @@
     <ds:schemaRef ds:uri="http://schemas.microsoft.com/sharepoint/v3"/>
     <ds:schemaRef ds:uri="71af3243-3dd4-4a8d-8c0d-dd76da1f02a5"/>
     <ds:schemaRef ds:uri="230e9df3-be65-4c73-a93b-d1236ebd677e"/>
+  </ds:schemaRefs>
+</ds:datastoreItem>
+</file>
+
+<file path=customXml/itemProps2.xml><?xml version="1.0" encoding="utf-8"?>
+<ds:datastoreItem xmlns:ds="http://schemas.openxmlformats.org/officeDocument/2006/customXml" ds:itemID="{0FD6FE22-81A0-4500-AFD0-342D21BB9A2C}">
+  <ds:schemaRefs>
+    <ds:schemaRef ds:uri="http://schemas.microsoft.com/sharepoint/v3/contenttype/forms"/>
   </ds:schemaRefs>
 </ds:datastoreItem>
 </file>

</xml_diff>